<commit_message>
Updated the presentation to be better
</commit_message>
<xml_diff>
--- a/Lab_01/Lab1.pptx
+++ b/Lab_01/Lab1.pptx
@@ -6,20 +6,21 @@
   </p:sldMasterIdLst>
   <p:sldIdLst>
     <p:sldId id="256" r:id="rId2"/>
-    <p:sldId id="257" r:id="rId3"/>
-    <p:sldId id="268" r:id="rId4"/>
-    <p:sldId id="269" r:id="rId5"/>
+    <p:sldId id="268" r:id="rId3"/>
+    <p:sldId id="257" r:id="rId4"/>
+    <p:sldId id="272" r:id="rId5"/>
     <p:sldId id="258" r:id="rId6"/>
     <p:sldId id="259" r:id="rId7"/>
     <p:sldId id="260" r:id="rId8"/>
     <p:sldId id="261" r:id="rId9"/>
     <p:sldId id="262" r:id="rId10"/>
     <p:sldId id="263" r:id="rId11"/>
-    <p:sldId id="264" r:id="rId12"/>
-    <p:sldId id="265" r:id="rId13"/>
-    <p:sldId id="266" r:id="rId14"/>
-    <p:sldId id="270" r:id="rId15"/>
-    <p:sldId id="267" r:id="rId16"/>
+    <p:sldId id="273" r:id="rId12"/>
+    <p:sldId id="264" r:id="rId13"/>
+    <p:sldId id="265" r:id="rId14"/>
+    <p:sldId id="266" r:id="rId15"/>
+    <p:sldId id="270" r:id="rId16"/>
+    <p:sldId id="267" r:id="rId17"/>
   </p:sldIdLst>
   <p:sldSz cx="9144000" cy="6858000" type="screen4x3"/>
   <p:notesSz cx="6858000" cy="9144000"/>
@@ -118,6 +119,22 @@
       </a:defRPr>
     </a:lvl9pPr>
   </p:defaultTextStyle>
+  <p:extLst>
+    <p:ext uri="{EFAFB233-063F-42B5-8137-9DF3F51BA10A}">
+      <p15:sldGuideLst xmlns:p15="http://schemas.microsoft.com/office/powerpoint/2012/main">
+        <p15:guide id="1" orient="horz" pos="2160">
+          <p15:clr>
+            <a:srgbClr val="A4A3A4"/>
+          </p15:clr>
+        </p15:guide>
+        <p15:guide id="2" pos="2880">
+          <p15:clr>
+            <a:srgbClr val="A4A3A4"/>
+          </p15:clr>
+        </p15:guide>
+      </p15:sldGuideLst>
+    </p:ext>
+  </p:extLst>
 </p:presentation>
 </file>
 
@@ -374,7 +391,7 @@
           <a:p>
             <a:fld id="{26516713-2BCE-6145-9123-DB8F3BB907A5}" type="datetimeFigureOut">
               <a:rPr lang="en-US" smtClean="0"/>
-              <a:t>9/1/14</a:t>
+              <a:t>9/7/16</a:t>
             </a:fld>
             <a:endParaRPr lang="en-US"/>
           </a:p>
@@ -588,7 +605,7 @@
           <a:p>
             <a:fld id="{26516713-2BCE-6145-9123-DB8F3BB907A5}" type="datetimeFigureOut">
               <a:rPr lang="en-US" smtClean="0"/>
-              <a:t>9/1/14</a:t>
+              <a:t>9/7/16</a:t>
             </a:fld>
             <a:endParaRPr lang="en-US"/>
           </a:p>
@@ -855,7 +872,7 @@
           <a:p>
             <a:fld id="{26516713-2BCE-6145-9123-DB8F3BB907A5}" type="datetimeFigureOut">
               <a:rPr lang="en-US" smtClean="0"/>
-              <a:t>9/1/14</a:t>
+              <a:t>9/7/16</a:t>
             </a:fld>
             <a:endParaRPr lang="en-US"/>
           </a:p>
@@ -1005,7 +1022,7 @@
           <a:p>
             <a:fld id="{26516713-2BCE-6145-9123-DB8F3BB907A5}" type="datetimeFigureOut">
               <a:rPr lang="en-US" smtClean="0"/>
-              <a:t>9/1/14</a:t>
+              <a:t>9/7/16</a:t>
             </a:fld>
             <a:endParaRPr lang="en-US"/>
           </a:p>
@@ -1335,7 +1352,7 @@
           <a:p>
             <a:fld id="{26516713-2BCE-6145-9123-DB8F3BB907A5}" type="datetimeFigureOut">
               <a:rPr lang="en-US" smtClean="0"/>
-              <a:t>9/1/14</a:t>
+              <a:t>9/7/16</a:t>
             </a:fld>
             <a:endParaRPr lang="en-US"/>
           </a:p>
@@ -1643,7 +1660,7 @@
           <a:p>
             <a:fld id="{26516713-2BCE-6145-9123-DB8F3BB907A5}" type="datetimeFigureOut">
               <a:rPr lang="en-US" smtClean="0"/>
-              <a:t>9/1/14</a:t>
+              <a:t>9/7/16</a:t>
             </a:fld>
             <a:endParaRPr lang="en-US"/>
           </a:p>
@@ -2064,7 +2081,7 @@
           <a:p>
             <a:fld id="{26516713-2BCE-6145-9123-DB8F3BB907A5}" type="datetimeFigureOut">
               <a:rPr lang="en-US" smtClean="0"/>
-              <a:t>9/1/14</a:t>
+              <a:t>9/7/16</a:t>
             </a:fld>
             <a:endParaRPr lang="en-US"/>
           </a:p>
@@ -2177,7 +2194,7 @@
           <a:p>
             <a:fld id="{26516713-2BCE-6145-9123-DB8F3BB907A5}" type="datetimeFigureOut">
               <a:rPr lang="en-US" smtClean="0"/>
-              <a:t>9/1/14</a:t>
+              <a:t>9/7/16</a:t>
             </a:fld>
             <a:endParaRPr lang="en-US"/>
           </a:p>
@@ -2336,7 +2353,7 @@
           <a:p>
             <a:fld id="{26516713-2BCE-6145-9123-DB8F3BB907A5}" type="datetimeFigureOut">
               <a:rPr lang="en-US" smtClean="0"/>
-              <a:t>9/1/14</a:t>
+              <a:t>9/7/16</a:t>
             </a:fld>
             <a:endParaRPr lang="en-US"/>
           </a:p>
@@ -2720,7 +2737,7 @@
           <a:p>
             <a:fld id="{26516713-2BCE-6145-9123-DB8F3BB907A5}" type="datetimeFigureOut">
               <a:rPr lang="en-US" smtClean="0"/>
-              <a:t>9/1/14</a:t>
+              <a:t>9/7/16</a:t>
             </a:fld>
             <a:endParaRPr lang="en-US"/>
           </a:p>
@@ -3083,7 +3100,7 @@
           <a:p>
             <a:fld id="{26516713-2BCE-6145-9123-DB8F3BB907A5}" type="datetimeFigureOut">
               <a:rPr lang="en-US" smtClean="0"/>
-              <a:t>9/1/14</a:t>
+              <a:t>9/7/16</a:t>
             </a:fld>
             <a:endParaRPr lang="en-US"/>
           </a:p>
@@ -3417,7 +3434,7 @@
           <a:p>
             <a:fld id="{26516713-2BCE-6145-9123-DB8F3BB907A5}" type="datetimeFigureOut">
               <a:rPr lang="en-US" smtClean="0"/>
-              <a:t>9/1/14</a:t>
+              <a:t>9/7/16</a:t>
             </a:fld>
             <a:endParaRPr lang="en-US"/>
           </a:p>
@@ -3846,7 +3863,19 @@
             </a:r>
             <a:r>
               <a:rPr lang="en-US" sz="3000" dirty="0" smtClean="0"/>
-              <a:t> Salehian</a:t>
+              <a:t> </a:t>
+            </a:r>
+            <a:r>
+              <a:rPr lang="en-US" sz="3000" dirty="0" err="1" smtClean="0"/>
+              <a:t>Salehian</a:t>
+            </a:r>
+            <a:endParaRPr lang="en-US" sz="3000" dirty="0" smtClean="0"/>
+          </a:p>
+          <a:p>
+            <a:pPr algn="ctr"/>
+            <a:r>
+              <a:rPr lang="en-US" sz="3000" dirty="0" smtClean="0"/>
+              <a:t>Modified by Max Fresonke</a:t>
             </a:r>
             <a:endParaRPr lang="en-US" sz="3000" dirty="0"/>
           </a:p>
@@ -4524,52 +4553,34 @@
             <p:ph idx="1"/>
           </p:nvPr>
         </p:nvSpPr>
-        <p:spPr>
-          <a:xfrm>
-            <a:off x="380999" y="1719071"/>
-            <a:ext cx="8407893" cy="4878722"/>
-          </a:xfrm>
-        </p:spPr>
-        <p:txBody>
-          <a:bodyPr>
-            <a:normAutofit/>
-          </a:bodyPr>
-          <a:lstStyle/>
-          <a:p>
-            <a:endParaRPr lang="en-US" sz="2800" dirty="0" smtClean="0"/>
-          </a:p>
-          <a:p>
-            <a:endParaRPr lang="en-US" sz="2800" dirty="0"/>
-          </a:p>
-          <a:p>
-            <a:r>
-              <a:rPr lang="en-US" sz="2800" dirty="0" smtClean="0"/>
-              <a:t>Write a code to determine if a number is a power of 2.</a:t>
-            </a:r>
-          </a:p>
-          <a:p>
-            <a:pPr lvl="1"/>
-            <a:endParaRPr lang="en-US" sz="2600" dirty="0"/>
-          </a:p>
-          <a:p>
-            <a:pPr lvl="1"/>
-            <a:r>
-              <a:rPr lang="en-US" sz="2600" dirty="0" smtClean="0"/>
-              <a:t>1, 2, 4, 8, … are powers of 2</a:t>
-            </a:r>
-          </a:p>
-          <a:p>
-            <a:pPr lvl="1"/>
-            <a:r>
-              <a:rPr lang="en-US" sz="2600" dirty="0" smtClean="0"/>
-              <a:t>3 is not.</a:t>
-            </a:r>
-          </a:p>
-          <a:p>
-            <a:endParaRPr lang="en-US" sz="2800" dirty="0" smtClean="0"/>
-          </a:p>
-          <a:p>
-            <a:endParaRPr lang="en-US" sz="2800" dirty="0"/>
+        <p:spPr/>
+        <p:txBody>
+          <a:bodyPr/>
+          <a:lstStyle/>
+          <a:p>
+            <a:r>
+              <a:rPr lang="en-US" dirty="0" smtClean="0"/>
+              <a:t>Yeah, it kind of stinks</a:t>
+            </a:r>
+          </a:p>
+          <a:p>
+            <a:endParaRPr lang="en-US" dirty="0"/>
+          </a:p>
+          <a:p>
+            <a:r>
+              <a:rPr lang="en-US" dirty="0" smtClean="0"/>
+              <a:t>You can run a little script (program) I made to install the badass atom editors on your computer!</a:t>
+            </a:r>
+          </a:p>
+          <a:p>
+            <a:endParaRPr lang="en-US" dirty="0"/>
+          </a:p>
+          <a:p>
+            <a:r>
+              <a:rPr lang="en-US" dirty="0" smtClean="0"/>
+              <a:t>Navigate to the </a:t>
+            </a:r>
+            <a:endParaRPr lang="en-US" dirty="0"/>
           </a:p>
         </p:txBody>
       </p:sp>
@@ -4590,7 +4601,15 @@
           <a:p>
             <a:r>
               <a:rPr lang="en-US" dirty="0" smtClean="0"/>
-              <a:t>Exercise (1)</a:t>
+              <a:t>How Great is </a:t>
+            </a:r>
+            <a:r>
+              <a:rPr lang="en-US" dirty="0" err="1" smtClean="0"/>
+              <a:t>gedit</a:t>
+            </a:r>
+            <a:r>
+              <a:rPr lang="en-US" dirty="0" smtClean="0"/>
+              <a:t>??</a:t>
             </a:r>
             <a:endParaRPr lang="en-US" dirty="0"/>
           </a:p>
@@ -4599,7 +4618,7 @@
     </p:spTree>
     <p:extLst>
       <p:ext uri="{BB962C8B-B14F-4D97-AF65-F5344CB8AC3E}">
-        <p14:creationId xmlns:p14="http://schemas.microsoft.com/office/powerpoint/2010/main" val="2838456003"/>
+        <p14:creationId xmlns:p14="http://schemas.microsoft.com/office/powerpoint/2010/main" val="1998711399"/>
       </p:ext>
     </p:extLst>
   </p:cSld>
@@ -4656,40 +4675,33 @@
           <a:p>
             <a:r>
               <a:rPr lang="en-US" sz="2800" dirty="0" smtClean="0"/>
-              <a:t>Write a code to determine if a number is a palindrome.</a:t>
-            </a:r>
+              <a:t>Write a code to determine if a number is a power of 2.</a:t>
+            </a:r>
+          </a:p>
+          <a:p>
+            <a:pPr lvl="1"/>
+            <a:endParaRPr lang="en-US" sz="2600" dirty="0"/>
+          </a:p>
+          <a:p>
+            <a:pPr lvl="1"/>
+            <a:r>
+              <a:rPr lang="en-US" sz="2600" dirty="0" smtClean="0"/>
+              <a:t>1, 2, 4, 8, … are powers of 2</a:t>
+            </a:r>
+          </a:p>
+          <a:p>
+            <a:pPr lvl="1"/>
+            <a:r>
+              <a:rPr lang="en-US" sz="2600" dirty="0" smtClean="0"/>
+              <a:t>3 is not.</a:t>
+            </a:r>
+          </a:p>
+          <a:p>
+            <a:endParaRPr lang="en-US" sz="2800" dirty="0" smtClean="0"/>
           </a:p>
           <a:p>
             <a:endParaRPr lang="en-US" sz="2800" dirty="0"/>
           </a:p>
-          <a:p>
-            <a:pPr lvl="1"/>
-            <a:r>
-              <a:rPr lang="en-US" sz="2400" dirty="0" smtClean="0"/>
-              <a:t>A palindrome number is equal to its reverse.</a:t>
-            </a:r>
-            <a:endParaRPr lang="en-US" sz="2400" dirty="0"/>
-          </a:p>
-          <a:p>
-            <a:pPr lvl="1"/>
-            <a:r>
-              <a:rPr lang="en-US" sz="2600" dirty="0" smtClean="0"/>
-              <a:t>121, 14541 are palindrome</a:t>
-            </a:r>
-          </a:p>
-          <a:p>
-            <a:pPr lvl="1"/>
-            <a:r>
-              <a:rPr lang="en-US" sz="2600" dirty="0" smtClean="0"/>
-              <a:t>134 is not</a:t>
-            </a:r>
-          </a:p>
-          <a:p>
-            <a:endParaRPr lang="en-US" sz="2800" dirty="0" smtClean="0"/>
-          </a:p>
-          <a:p>
-            <a:endParaRPr lang="en-US" sz="2800" dirty="0"/>
-          </a:p>
         </p:txBody>
       </p:sp>
       <p:sp>
@@ -4709,7 +4721,7 @@
           <a:p>
             <a:r>
               <a:rPr lang="en-US" dirty="0" smtClean="0"/>
-              <a:t>Exercise (2)</a:t>
+              <a:t>Exercise (1)</a:t>
             </a:r>
             <a:endParaRPr lang="en-US" dirty="0"/>
           </a:p>
@@ -4718,7 +4730,7 @@
     </p:spTree>
     <p:extLst>
       <p:ext uri="{BB962C8B-B14F-4D97-AF65-F5344CB8AC3E}">
-        <p14:creationId xmlns:p14="http://schemas.microsoft.com/office/powerpoint/2010/main" val="401986704"/>
+        <p14:creationId xmlns:p14="http://schemas.microsoft.com/office/powerpoint/2010/main" val="2838456003"/>
       </p:ext>
     </p:extLst>
   </p:cSld>
@@ -4775,7 +4787,7 @@
           <a:p>
             <a:r>
               <a:rPr lang="en-US" sz="2800" dirty="0" smtClean="0"/>
-              <a:t>Write a code to print the Fibonacci series up to a given number</a:t>
+              <a:t>Write a code to determine if a number is a palindrome.</a:t>
             </a:r>
           </a:p>
           <a:p>
@@ -4785,25 +4797,25 @@
             <a:pPr lvl="1"/>
             <a:r>
               <a:rPr lang="en-US" sz="2400" dirty="0" smtClean="0"/>
-              <a:t>Fibonacci Sequence: 1, 1, 2, 3, 5, 8, 13, 21, 34, …</a:t>
-            </a:r>
+              <a:t>A palindrome number is equal to its reverse.</a:t>
+            </a:r>
+            <a:endParaRPr lang="en-US" sz="2400" dirty="0"/>
           </a:p>
           <a:p>
             <a:pPr lvl="1"/>
-            <a:endParaRPr lang="en-US" sz="2400" dirty="0"/>
+            <a:r>
+              <a:rPr lang="en-US" sz="2600" dirty="0" smtClean="0"/>
+              <a:t>121, 14541 are palindrome</a:t>
+            </a:r>
           </a:p>
           <a:p>
             <a:pPr lvl="1"/>
             <a:r>
-              <a:rPr lang="en-US" sz="2400" dirty="0" smtClean="0"/>
-              <a:t>N = 4. </a:t>
-            </a:r>
-            <a:r>
-              <a:rPr lang="en-US" sz="2400" dirty="0" smtClean="0">
-                <a:sym typeface="Wingdings"/>
-              </a:rPr>
-              <a:t> Output: 1,1,2,3.</a:t>
-            </a:r>
+              <a:rPr lang="en-US" sz="2600" dirty="0" smtClean="0"/>
+              <a:t>134 is not</a:t>
+            </a:r>
+          </a:p>
+          <a:p>
             <a:endParaRPr lang="en-US" sz="2800" dirty="0" smtClean="0"/>
           </a:p>
           <a:p>
@@ -4828,7 +4840,7 @@
           <a:p>
             <a:r>
               <a:rPr lang="en-US" dirty="0" smtClean="0"/>
-              <a:t>Exercise (3)</a:t>
+              <a:t>Exercise (2)</a:t>
             </a:r>
             <a:endParaRPr lang="en-US" dirty="0"/>
           </a:p>
@@ -4837,7 +4849,7 @@
     </p:spTree>
     <p:extLst>
       <p:ext uri="{BB962C8B-B14F-4D97-AF65-F5344CB8AC3E}">
-        <p14:creationId xmlns:p14="http://schemas.microsoft.com/office/powerpoint/2010/main" val="1731111996"/>
+        <p14:creationId xmlns:p14="http://schemas.microsoft.com/office/powerpoint/2010/main" val="401986704"/>
       </p:ext>
     </p:extLst>
   </p:cSld>
@@ -4894,13 +4906,127 @@
           <a:p>
             <a:r>
               <a:rPr lang="en-US" sz="2800" dirty="0" smtClean="0"/>
-              <a:t>Write a code </a:t>
-            </a:r>
+              <a:t>Write a code to print the Fibonacci series up to a given number</a:t>
+            </a:r>
+          </a:p>
+          <a:p>
+            <a:endParaRPr lang="en-US" sz="2800" dirty="0"/>
+          </a:p>
+          <a:p>
+            <a:pPr lvl="1"/>
+            <a:r>
+              <a:rPr lang="en-US" sz="2400" dirty="0" smtClean="0"/>
+              <a:t>Fibonacci Sequence: 1, 1, 2, 3, 5, 8, 13, 21, 34, …</a:t>
+            </a:r>
+          </a:p>
+          <a:p>
+            <a:pPr lvl="1"/>
+            <a:endParaRPr lang="en-US" sz="2400" dirty="0"/>
+          </a:p>
+          <a:p>
+            <a:pPr lvl="1"/>
+            <a:r>
+              <a:rPr lang="en-US" sz="2400" dirty="0" smtClean="0"/>
+              <a:t>N = 4. </a:t>
+            </a:r>
+            <a:r>
+              <a:rPr lang="en-US" sz="2400" dirty="0" smtClean="0">
+                <a:sym typeface="Wingdings"/>
+              </a:rPr>
+              <a:t> Output: 1,1,2,3.</a:t>
+            </a:r>
+            <a:endParaRPr lang="en-US" sz="2800" dirty="0" smtClean="0"/>
+          </a:p>
+          <a:p>
+            <a:endParaRPr lang="en-US" sz="2800" dirty="0"/>
+          </a:p>
+        </p:txBody>
+      </p:sp>
+      <p:sp>
+        <p:nvSpPr>
+          <p:cNvPr id="3" name="Title 2"/>
+          <p:cNvSpPr>
+            <a:spLocks noGrp="1"/>
+          </p:cNvSpPr>
+          <p:nvPr>
+            <p:ph type="title"/>
+          </p:nvPr>
+        </p:nvSpPr>
+        <p:spPr/>
+        <p:txBody>
+          <a:bodyPr/>
+          <a:lstStyle/>
+          <a:p>
+            <a:r>
+              <a:rPr lang="en-US" dirty="0" smtClean="0"/>
+              <a:t>Exercise (3)</a:t>
+            </a:r>
+            <a:endParaRPr lang="en-US" dirty="0"/>
+          </a:p>
+        </p:txBody>
+      </p:sp>
+    </p:spTree>
+    <p:extLst>
+      <p:ext uri="{BB962C8B-B14F-4D97-AF65-F5344CB8AC3E}">
+        <p14:creationId xmlns:p14="http://schemas.microsoft.com/office/powerpoint/2010/main" val="1731111996"/>
+      </p:ext>
+    </p:extLst>
+  </p:cSld>
+  <p:clrMapOvr>
+    <a:masterClrMapping/>
+  </p:clrMapOvr>
+</p:sld>
+</file>
+
+<file path=ppt/slides/slide15.xml><?xml version="1.0" encoding="utf-8"?>
+<p:sld xmlns:a="http://schemas.openxmlformats.org/drawingml/2006/main" xmlns:r="http://schemas.openxmlformats.org/officeDocument/2006/relationships" xmlns:p="http://schemas.openxmlformats.org/presentationml/2006/main">
+  <p:cSld>
+    <p:spTree>
+      <p:nvGrpSpPr>
+        <p:cNvPr id="1" name=""/>
+        <p:cNvGrpSpPr/>
+        <p:nvPr/>
+      </p:nvGrpSpPr>
+      <p:grpSpPr>
+        <a:xfrm>
+          <a:off x="0" y="0"/>
+          <a:ext cx="0" cy="0"/>
+          <a:chOff x="0" y="0"/>
+          <a:chExt cx="0" cy="0"/>
+        </a:xfrm>
+      </p:grpSpPr>
+      <p:sp>
+        <p:nvSpPr>
+          <p:cNvPr id="2" name="Content Placeholder 1"/>
+          <p:cNvSpPr>
+            <a:spLocks noGrp="1"/>
+          </p:cNvSpPr>
+          <p:nvPr>
+            <p:ph idx="1"/>
+          </p:nvPr>
+        </p:nvSpPr>
+        <p:spPr>
+          <a:xfrm>
+            <a:off x="380999" y="1719071"/>
+            <a:ext cx="8407893" cy="4878722"/>
+          </a:xfrm>
+        </p:spPr>
+        <p:txBody>
+          <a:bodyPr>
+            <a:normAutofit/>
+          </a:bodyPr>
+          <a:lstStyle/>
+          <a:p>
+            <a:endParaRPr lang="en-US" sz="2800" dirty="0" smtClean="0"/>
+          </a:p>
+          <a:p>
+            <a:endParaRPr lang="en-US" sz="2800" dirty="0"/>
+          </a:p>
+          <a:p>
             <a:r>
               <a:rPr lang="en-US" sz="2800" dirty="0" smtClean="0"/>
-              <a:t>to compute the Greatest Common Divisor (GCD) of a pair of numbers. </a:t>
-            </a:r>
-            <a:endParaRPr lang="en-US" sz="2800" dirty="0" smtClean="0"/>
+              <a:t>Write a code to compute the Greatest Common Divisor (GCD) of a pair of numbers. </a:t>
+            </a:r>
           </a:p>
           <a:p>
             <a:endParaRPr lang="en-US" sz="2800" dirty="0"/>
@@ -4911,7 +5037,6 @@
               <a:rPr lang="en-US" sz="2400" dirty="0" smtClean="0"/>
               <a:t>Input: 8, 12</a:t>
             </a:r>
-            <a:endParaRPr lang="en-US" sz="2400" dirty="0" smtClean="0"/>
           </a:p>
           <a:p>
             <a:pPr lvl="1"/>
@@ -4923,13 +5048,7 @@
               <a:rPr lang="en-US" sz="2400" dirty="0" smtClean="0">
                 <a:sym typeface="Wingdings"/>
               </a:rPr>
-              <a:t>Output</a:t>
-            </a:r>
-            <a:r>
-              <a:rPr lang="en-US" sz="2400" dirty="0" smtClean="0">
-                <a:sym typeface="Wingdings"/>
-              </a:rPr>
-              <a:t>: </a:t>
+              <a:t>Output: </a:t>
             </a:r>
             <a:r>
               <a:rPr lang="en-US" sz="2400" dirty="0">
@@ -4961,11 +5080,7 @@
           <a:p>
             <a:r>
               <a:rPr lang="en-US" dirty="0" smtClean="0"/>
-              <a:t>Exercise </a:t>
-            </a:r>
-            <a:r>
-              <a:rPr lang="en-US" dirty="0" smtClean="0"/>
-              <a:t>(4)</a:t>
+              <a:t>Exercise (4)</a:t>
             </a:r>
             <a:endParaRPr lang="en-US" dirty="0"/>
           </a:p>
@@ -4984,7 +5099,7 @@
 </p:sld>
 </file>
 
-<file path=ppt/slides/slide15.xml><?xml version="1.0" encoding="utf-8"?>
+<file path=ppt/slides/slide16.xml><?xml version="1.0" encoding="utf-8"?>
 <p:sld xmlns:a="http://schemas.openxmlformats.org/drawingml/2006/main" xmlns:r="http://schemas.openxmlformats.org/officeDocument/2006/relationships" xmlns:p="http://schemas.openxmlformats.org/presentationml/2006/main">
   <p:cSld>
     <p:spTree>
@@ -5103,7 +5218,7 @@
       </p:grpSpPr>
       <p:sp>
         <p:nvSpPr>
-          <p:cNvPr id="3" name="Content Placeholder 2"/>
+          <p:cNvPr id="2" name="Content Placeholder 1"/>
           <p:cNvSpPr>
             <a:spLocks noGrp="1"/>
           </p:cNvSpPr>
@@ -5111,90 +5226,185 @@
             <p:ph idx="1"/>
           </p:nvPr>
         </p:nvSpPr>
-        <p:spPr/>
-        <p:txBody>
-          <a:bodyPr>
-            <a:normAutofit/>
-          </a:bodyPr>
-          <a:lstStyle/>
-          <a:p>
-            <a:r>
-              <a:rPr lang="en-US" sz="2800" dirty="0" smtClean="0"/>
-              <a:t>You need a CISE account to log in to the computers.</a:t>
-            </a:r>
-          </a:p>
-          <a:p>
-            <a:r>
-              <a:rPr lang="en-US" sz="2800" dirty="0" smtClean="0"/>
-              <a:t>Pick a Linux machine, enter your information and log in!</a:t>
-            </a:r>
-          </a:p>
-          <a:p>
-            <a:r>
-              <a:rPr lang="en-US" sz="2800" dirty="0" smtClean="0"/>
-              <a:t>Then, open a Terminal…</a:t>
-            </a:r>
-            <a:endParaRPr lang="en-US" sz="2800" dirty="0"/>
-          </a:p>
-        </p:txBody>
-      </p:sp>
-      <p:sp>
-        <p:nvSpPr>
-          <p:cNvPr id="2" name="Title 1"/>
-          <p:cNvSpPr>
-            <a:spLocks noGrp="1"/>
-          </p:cNvSpPr>
-          <p:nvPr>
-            <p:ph type="title"/>
-          </p:nvPr>
-        </p:nvSpPr>
-        <p:spPr/>
-        <p:txBody>
-          <a:bodyPr/>
-          <a:lstStyle/>
-          <a:p>
-            <a:r>
-              <a:rPr lang="en-US" dirty="0" smtClean="0"/>
-              <a:t>Let’s Start!</a:t>
-            </a:r>
-            <a:endParaRPr lang="en-US" dirty="0"/>
-          </a:p>
-        </p:txBody>
-      </p:sp>
-      <p:pic>
-        <p:nvPicPr>
-          <p:cNvPr id="4" name="Picture 3" descr="Screenshot-Terminal.png"/>
-          <p:cNvPicPr>
-            <a:picLocks noChangeAspect="1"/>
-          </p:cNvPicPr>
-          <p:nvPr/>
-        </p:nvPicPr>
-        <p:blipFill>
-          <a:blip r:embed="rId2">
-            <a:extLst>
-              <a:ext uri="{28A0092B-C50C-407E-A947-70E740481C1C}">
-                <a14:useLocalDpi xmlns:a14="http://schemas.microsoft.com/office/drawing/2010/main" val="0"/>
-              </a:ext>
-            </a:extLst>
-          </a:blip>
-          <a:stretch>
-            <a:fillRect/>
-          </a:stretch>
-        </p:blipFill>
         <p:spPr>
           <a:xfrm>
-            <a:off x="2921122" y="4223901"/>
-            <a:ext cx="3639351" cy="2437262"/>
+            <a:off x="141118" y="1719071"/>
+            <a:ext cx="8837509" cy="4407408"/>
           </a:xfrm>
-          <a:prstGeom prst="rect">
-            <a:avLst/>
-          </a:prstGeom>
         </p:spPr>
-      </p:pic>
+        <p:txBody>
+          <a:bodyPr>
+            <a:normAutofit fontScale="92500" lnSpcReduction="20000"/>
+          </a:bodyPr>
+          <a:lstStyle/>
+          <a:p>
+            <a:r>
+              <a:rPr lang="en-US" sz="2400" dirty="0" smtClean="0"/>
+              <a:t>All of </a:t>
+            </a:r>
+            <a:r>
+              <a:rPr lang="en-US" sz="2400" i="1" dirty="0" smtClean="0"/>
+              <a:t>your</a:t>
+            </a:r>
+            <a:r>
+              <a:rPr lang="en-US" sz="2400" dirty="0" smtClean="0"/>
+              <a:t> files in your </a:t>
+            </a:r>
+            <a:r>
+              <a:rPr lang="en-US" sz="2400" dirty="0" err="1" smtClean="0"/>
+              <a:t>cise</a:t>
+            </a:r>
+            <a:r>
+              <a:rPr lang="en-US" sz="2400" dirty="0" smtClean="0"/>
+              <a:t> computers are synced and available from the outside - Nice!</a:t>
+            </a:r>
+          </a:p>
+          <a:p>
+            <a:pPr lvl="1"/>
+            <a:r>
+              <a:rPr lang="en-US" sz="2200" dirty="0" smtClean="0"/>
+              <a:t>Software I recommend to access:</a:t>
+            </a:r>
+            <a:endParaRPr lang="en-US" sz="2200" dirty="0"/>
+          </a:p>
+          <a:p>
+            <a:pPr lvl="2"/>
+            <a:r>
+              <a:rPr lang="en-US" sz="2200" dirty="0" smtClean="0"/>
+              <a:t>Windows: FileZilla</a:t>
+            </a:r>
+          </a:p>
+          <a:p>
+            <a:pPr lvl="2"/>
+            <a:r>
+              <a:rPr lang="en-US" sz="2200" dirty="0" smtClean="0"/>
+              <a:t>Mac: </a:t>
+            </a:r>
+            <a:r>
+              <a:rPr lang="en-US" sz="2200" dirty="0" err="1" smtClean="0"/>
+              <a:t>Cyberduck</a:t>
+            </a:r>
+            <a:endParaRPr lang="en-US" sz="2200" dirty="0" smtClean="0"/>
+          </a:p>
+          <a:p>
+            <a:pPr lvl="2"/>
+            <a:r>
+              <a:rPr lang="en-US" sz="2200" dirty="0" smtClean="0"/>
+              <a:t>Linux: Native to Interface (if available) or FileZilla</a:t>
+            </a:r>
+          </a:p>
+          <a:p>
+            <a:pPr lvl="1"/>
+            <a:r>
+              <a:rPr lang="en-US" sz="2600" dirty="0" err="1" smtClean="0"/>
+              <a:t>sftp</a:t>
+            </a:r>
+            <a:r>
+              <a:rPr lang="en-US" sz="2600" dirty="0" smtClean="0"/>
+              <a:t>://</a:t>
+            </a:r>
+            <a:r>
+              <a:rPr lang="en-US" sz="2600" dirty="0" err="1" smtClean="0"/>
+              <a:t>thunder.cise.ufl.edu</a:t>
+            </a:r>
+            <a:endParaRPr lang="en-US" sz="2600" dirty="0" smtClean="0"/>
+          </a:p>
+          <a:p>
+            <a:pPr lvl="1"/>
+            <a:r>
+              <a:rPr lang="en-US" sz="2600" dirty="0" smtClean="0"/>
+              <a:t>For anyone interested, can go over it after the main presentation.</a:t>
+            </a:r>
+          </a:p>
+          <a:p>
+            <a:r>
+              <a:rPr lang="en-US" sz="2800" dirty="0" smtClean="0"/>
+              <a:t>You can also use ”remote </a:t>
+            </a:r>
+            <a:r>
+              <a:rPr lang="en-US" sz="2800" dirty="0" err="1" smtClean="0"/>
+              <a:t>shell”SSH</a:t>
+            </a:r>
+            <a:r>
+              <a:rPr lang="en-US" sz="2800" dirty="0" smtClean="0"/>
+              <a:t> is available too, but we will go over that (maybe) next lab.</a:t>
+            </a:r>
+            <a:endParaRPr lang="en-US" sz="2800" dirty="0"/>
+          </a:p>
+          <a:p>
+            <a:endParaRPr lang="en-US" sz="2400" dirty="0"/>
+          </a:p>
+          <a:p>
+            <a:r>
+              <a:rPr lang="en-US" sz="2400" dirty="0" smtClean="0"/>
+              <a:t>Official docs: </a:t>
+            </a:r>
+            <a:r>
+              <a:rPr lang="en-US" sz="2400" dirty="0" smtClean="0">
+                <a:hlinkClick r:id="rId2"/>
+              </a:rPr>
+              <a:t>http</a:t>
+            </a:r>
+            <a:r>
+              <a:rPr lang="en-US" sz="2400" dirty="0">
+                <a:hlinkClick r:id="rId2"/>
+              </a:rPr>
+              <a:t>://cise.ufl.edu/help/access/remote/</a:t>
+            </a:r>
+            <a:endParaRPr lang="en-US" sz="2400" dirty="0"/>
+          </a:p>
+          <a:p>
+            <a:endParaRPr lang="en-US" sz="2400" dirty="0" smtClean="0"/>
+          </a:p>
+          <a:p>
+            <a:pPr marL="45720" indent="0">
+              <a:buNone/>
+            </a:pPr>
+            <a:endParaRPr lang="en-US" sz="1800" dirty="0"/>
+          </a:p>
+          <a:p>
+            <a:endParaRPr lang="en-US" sz="1800" dirty="0"/>
+          </a:p>
+        </p:txBody>
+      </p:sp>
+      <p:sp>
+        <p:nvSpPr>
+          <p:cNvPr id="3" name="Title 2"/>
+          <p:cNvSpPr>
+            <a:spLocks noGrp="1"/>
+          </p:cNvSpPr>
+          <p:nvPr>
+            <p:ph type="title"/>
+          </p:nvPr>
+        </p:nvSpPr>
+        <p:spPr/>
+        <p:txBody>
+          <a:bodyPr/>
+          <a:lstStyle/>
+          <a:p>
+            <a:r>
+              <a:rPr lang="en-US" dirty="0" smtClean="0"/>
+              <a:t>Access </a:t>
+            </a:r>
+            <a:r>
+              <a:rPr lang="en-US" dirty="0"/>
+              <a:t>remotely</a:t>
+            </a:r>
+            <a:br>
+              <a:rPr lang="en-US" dirty="0"/>
+            </a:br>
+            <a:r>
+              <a:rPr lang="en-US" sz="1800" dirty="0" smtClean="0"/>
+              <a:t>You do not need to follow these now.</a:t>
+            </a:r>
+            <a:endParaRPr lang="en-US" dirty="0"/>
+          </a:p>
+        </p:txBody>
+      </p:sp>
     </p:spTree>
     <p:extLst>
       <p:ext uri="{BB962C8B-B14F-4D97-AF65-F5344CB8AC3E}">
-        <p14:creationId xmlns:p14="http://schemas.microsoft.com/office/powerpoint/2010/main" val="1306151526"/>
+        <p14:creationId xmlns:p14="http://schemas.microsoft.com/office/powerpoint/2010/main" val="3464797091"/>
       </p:ext>
     </p:extLst>
   </p:cSld>
@@ -5223,7 +5433,7 @@
       </p:grpSpPr>
       <p:sp>
         <p:nvSpPr>
-          <p:cNvPr id="2" name="Content Placeholder 1"/>
+          <p:cNvPr id="3" name="Content Placeholder 2"/>
           <p:cNvSpPr>
             <a:spLocks noGrp="1"/>
           </p:cNvSpPr>
@@ -5231,12 +5441,7 @@
             <p:ph idx="1"/>
           </p:nvPr>
         </p:nvSpPr>
-        <p:spPr>
-          <a:xfrm>
-            <a:off x="141118" y="1719071"/>
-            <a:ext cx="8837509" cy="4407408"/>
-          </a:xfrm>
-        </p:spPr>
+        <p:spPr/>
         <p:txBody>
           <a:bodyPr>
             <a:normAutofit/>
@@ -5244,151 +5449,51 @@
           <a:lstStyle/>
           <a:p>
             <a:r>
-              <a:rPr lang="en-US" sz="2400" dirty="0" smtClean="0"/>
-              <a:t>You can access CISE servers remotely, through Linux, </a:t>
-            </a:r>
-            <a:r>
-              <a:rPr lang="en-US" sz="2400" dirty="0" err="1" smtClean="0"/>
-              <a:t>MacOS</a:t>
-            </a:r>
-            <a:r>
-              <a:rPr lang="en-US" sz="2400" dirty="0" smtClean="0"/>
-              <a:t> or Putty terminal.</a:t>
-            </a:r>
-          </a:p>
-          <a:p>
-            <a:r>
-              <a:rPr lang="en-US" sz="2400" dirty="0" smtClean="0"/>
-              <a:t>E.g., [storm, thunder, sun1].</a:t>
-            </a:r>
-            <a:r>
-              <a:rPr lang="en-US" sz="2400" dirty="0" err="1" smtClean="0"/>
-              <a:t>cise.ufl.edu</a:t>
-            </a:r>
-            <a:endParaRPr lang="en-US" sz="2400" dirty="0" smtClean="0"/>
-          </a:p>
-          <a:p>
-            <a:pPr marL="45720" indent="0">
-              <a:buNone/>
-            </a:pPr>
-            <a:endParaRPr lang="en-US" sz="1800" dirty="0" smtClean="0"/>
-          </a:p>
-          <a:p>
-            <a:pPr marL="45720" indent="0">
-              <a:buNone/>
-            </a:pPr>
-            <a:r>
-              <a:rPr lang="en-US" sz="1800" dirty="0" smtClean="0"/>
-              <a:t>&gt;&gt; </a:t>
-            </a:r>
-            <a:r>
-              <a:rPr lang="en-US" sz="1800" dirty="0" err="1" smtClean="0"/>
-              <a:t>ssh</a:t>
-            </a:r>
-            <a:r>
-              <a:rPr lang="en-US" sz="1800" dirty="0" smtClean="0"/>
-              <a:t> [</a:t>
-            </a:r>
-            <a:r>
-              <a:rPr lang="en-US" sz="1800" dirty="0" err="1" smtClean="0"/>
-              <a:t>cise_user_name</a:t>
-            </a:r>
-            <a:r>
-              <a:rPr lang="en-US" sz="1800" dirty="0" smtClean="0"/>
-              <a:t>]@</a:t>
-            </a:r>
-            <a:r>
-              <a:rPr lang="en-US" sz="1800" dirty="0" err="1"/>
-              <a:t>storm.cise.ufl.edu</a:t>
-            </a:r>
-            <a:endParaRPr lang="en-US" sz="1800" dirty="0"/>
-          </a:p>
-          <a:p>
-            <a:pPr marL="45720" indent="0">
-              <a:buNone/>
-            </a:pPr>
-            <a:r>
-              <a:rPr lang="en-US" sz="1800" dirty="0" smtClean="0"/>
-              <a:t>&gt;&gt; [</a:t>
-            </a:r>
-            <a:r>
-              <a:rPr lang="en-US" sz="1800" dirty="0" err="1" smtClean="0"/>
-              <a:t>cise_user_name</a:t>
-            </a:r>
-            <a:r>
-              <a:rPr lang="en-US" sz="1800" dirty="0" smtClean="0"/>
-              <a:t>]@</a:t>
-            </a:r>
-            <a:r>
-              <a:rPr lang="en-US" sz="1800" dirty="0" err="1"/>
-              <a:t>storm.cise.ufl.edu's</a:t>
-            </a:r>
-            <a:r>
-              <a:rPr lang="en-US" sz="1800" dirty="0"/>
-              <a:t> password: </a:t>
-            </a:r>
-            <a:endParaRPr lang="en-US" sz="1800" dirty="0" smtClean="0"/>
-          </a:p>
-          <a:p>
-            <a:pPr marL="45720" indent="0">
-              <a:buNone/>
-            </a:pPr>
-            <a:r>
-              <a:rPr lang="en-US" sz="1800" dirty="0" smtClean="0"/>
-              <a:t>.</a:t>
-            </a:r>
-          </a:p>
-          <a:p>
-            <a:pPr marL="45720" indent="0">
-              <a:buNone/>
-            </a:pPr>
-            <a:r>
-              <a:rPr lang="en-US" sz="1800" dirty="0" smtClean="0"/>
-              <a:t>.</a:t>
-            </a:r>
-          </a:p>
-          <a:p>
-            <a:pPr marL="45720" indent="0">
-              <a:buNone/>
-            </a:pPr>
-            <a:r>
-              <a:rPr lang="en-US" sz="1800" dirty="0" smtClean="0"/>
-              <a:t>.</a:t>
-            </a:r>
-          </a:p>
-          <a:p>
-            <a:pPr marL="45720" indent="0">
-              <a:buNone/>
-            </a:pPr>
-            <a:r>
-              <a:rPr lang="en-US" sz="1800" dirty="0" smtClean="0"/>
-              <a:t>&gt;&gt; storm</a:t>
-            </a:r>
-            <a:r>
-              <a:rPr lang="en-US" sz="1800" dirty="0"/>
-              <a:t>:1% </a:t>
-            </a:r>
-          </a:p>
-          <a:p>
-            <a:pPr marL="45720" indent="0">
-              <a:buNone/>
-            </a:pPr>
-            <a:endParaRPr lang="en-US" sz="1800" dirty="0" smtClean="0"/>
-          </a:p>
-          <a:p>
-            <a:pPr marL="45720" indent="0">
-              <a:buNone/>
-            </a:pPr>
-            <a:endParaRPr lang="en-US" sz="1800" dirty="0"/>
-          </a:p>
-          <a:p>
-            <a:endParaRPr lang="en-US" sz="1800" dirty="0"/>
-          </a:p>
-        </p:txBody>
-      </p:sp>
-      <p:sp>
-        <p:nvSpPr>
-          <p:cNvPr id="3" name="Title 2"/>
+              <a:rPr lang="en-US" sz="2800" dirty="0" smtClean="0"/>
+              <a:t>You need a CISE account to log in to the computers.</a:t>
+            </a:r>
+          </a:p>
+          <a:p>
+            <a:r>
+              <a:rPr lang="en-US" sz="2800" dirty="0" smtClean="0"/>
+              <a:t>Pick a Linux machine, enter your information and log in!</a:t>
+            </a:r>
+          </a:p>
+          <a:p>
+            <a:r>
+              <a:rPr lang="en-US" sz="2800" dirty="0" smtClean="0"/>
+              <a:t>Then, open a </a:t>
+            </a:r>
+            <a:r>
+              <a:rPr lang="en-US" sz="2800" dirty="0" smtClean="0"/>
+              <a:t>Terminal!</a:t>
+            </a:r>
+          </a:p>
+          <a:p>
+            <a:pPr lvl="1"/>
+            <a:r>
+              <a:rPr lang="en-US" sz="2600" dirty="0" smtClean="0"/>
+              <a:t>It is your friend! I promise.</a:t>
+            </a:r>
+          </a:p>
+          <a:p>
+            <a:r>
+              <a:rPr lang="en-US" sz="2800" b="1" dirty="0" smtClean="0">
+                <a:hlinkClick r:id="rId2"/>
+              </a:rPr>
+              <a:t>http://tinyurl.com/cop3503-cmd-basics</a:t>
+            </a:r>
+            <a:endParaRPr lang="en-US" sz="2800" dirty="0" smtClean="0"/>
+          </a:p>
+          <a:p>
+            <a:pPr lvl="1"/>
+            <a:endParaRPr lang="en-US" sz="2600" dirty="0"/>
+          </a:p>
+        </p:txBody>
+      </p:sp>
+      <p:sp>
+        <p:nvSpPr>
+          <p:cNvPr id="2" name="Title 1"/>
           <p:cNvSpPr>
             <a:spLocks noGrp="1"/>
           </p:cNvSpPr>
@@ -5403,16 +5508,46 @@
           <a:p>
             <a:r>
               <a:rPr lang="en-US" dirty="0" smtClean="0"/>
-              <a:t>Access remotely</a:t>
+              <a:t>Let’s Start!</a:t>
             </a:r>
             <a:endParaRPr lang="en-US" dirty="0"/>
           </a:p>
         </p:txBody>
       </p:sp>
+      <p:pic>
+        <p:nvPicPr>
+          <p:cNvPr id="4" name="Picture 3" descr="Screenshot-Terminal.png"/>
+          <p:cNvPicPr>
+            <a:picLocks noChangeAspect="1"/>
+          </p:cNvPicPr>
+          <p:nvPr/>
+        </p:nvPicPr>
+        <p:blipFill>
+          <a:blip r:embed="rId3">
+            <a:extLst>
+              <a:ext uri="{28A0092B-C50C-407E-A947-70E740481C1C}">
+                <a14:useLocalDpi xmlns:a14="http://schemas.microsoft.com/office/drawing/2010/main" val="0"/>
+              </a:ext>
+            </a:extLst>
+          </a:blip>
+          <a:stretch>
+            <a:fillRect/>
+          </a:stretch>
+        </p:blipFill>
+        <p:spPr>
+          <a:xfrm>
+            <a:off x="6176513" y="3303808"/>
+            <a:ext cx="1777042" cy="1190079"/>
+          </a:xfrm>
+          <a:prstGeom prst="rect">
+            <a:avLst/>
+          </a:prstGeom>
+        </p:spPr>
+      </p:pic>
     </p:spTree>
     <p:extLst>
       <p:ext uri="{BB962C8B-B14F-4D97-AF65-F5344CB8AC3E}">
-        <p14:creationId xmlns:p14="http://schemas.microsoft.com/office/powerpoint/2010/main" val="3464797091"/>
+        <p14:creationId xmlns:p14="http://schemas.microsoft.com/office/powerpoint/2010/main" val="1306151526"/>
       </p:ext>
     </p:extLst>
   </p:cSld>
@@ -5451,85 +5586,221 @@
         </p:nvSpPr>
         <p:spPr>
           <a:xfrm>
-            <a:off x="141118" y="1719071"/>
-            <a:ext cx="8837509" cy="4407408"/>
+            <a:off x="380999" y="1719071"/>
+            <a:ext cx="8407893" cy="4543706"/>
           </a:xfrm>
         </p:spPr>
         <p:txBody>
           <a:bodyPr>
-            <a:normAutofit/>
+            <a:normAutofit fontScale="92500" lnSpcReduction="20000"/>
           </a:bodyPr>
           <a:lstStyle/>
           <a:p>
-            <a:r>
-              <a:rPr lang="en-US" sz="2400" dirty="0" smtClean="0"/>
-              <a:t>In order to make secure file transfers (e.g., FTP) to/from the same servers, you can use one of the following software:</a:t>
+            <a:pPr fontAlgn="base"/>
+            <a:r>
+              <a:rPr lang="en-US" dirty="0"/>
+              <a:t>In the terminal, you are always “in a directory”</a:t>
+            </a:r>
+          </a:p>
+          <a:p>
+            <a:pPr lvl="1" fontAlgn="base"/>
+            <a:r>
+              <a:rPr lang="en-US" dirty="0"/>
+              <a:t>Called “Working Directory”</a:t>
+            </a:r>
+          </a:p>
+          <a:p>
+            <a:pPr lvl="1" fontAlgn="base"/>
+            <a:r>
+              <a:rPr lang="en-US" dirty="0" smtClean="0"/>
+              <a:t>Use “</a:t>
+            </a:r>
+            <a:r>
+              <a:rPr lang="en-US" dirty="0" err="1"/>
+              <a:t>pwd</a:t>
+            </a:r>
+            <a:r>
+              <a:rPr lang="en-US" dirty="0" smtClean="0"/>
+              <a:t>” (present working directory) </a:t>
+            </a:r>
+            <a:r>
+              <a:rPr lang="en-US" dirty="0" err="1" smtClean="0"/>
+              <a:t>cmd</a:t>
+            </a:r>
+            <a:r>
+              <a:rPr lang="en-US" dirty="0" smtClean="0"/>
+              <a:t> to </a:t>
+            </a:r>
+            <a:r>
+              <a:rPr lang="en-US" dirty="0"/>
+              <a:t>find out where we are</a:t>
+            </a:r>
+            <a:r>
+              <a:rPr lang="en-US" dirty="0" smtClean="0"/>
+              <a:t>.</a:t>
+            </a:r>
+          </a:p>
+          <a:p>
+            <a:pPr lvl="1" fontAlgn="base"/>
+            <a:r>
+              <a:rPr lang="en-US" dirty="0" smtClean="0"/>
+              <a:t>Your “home” directory is all about you. It’s where </a:t>
+            </a:r>
+            <a:r>
+              <a:rPr lang="en-US" i="1" dirty="0" smtClean="0"/>
+              <a:t>you</a:t>
+            </a:r>
+            <a:r>
+              <a:rPr lang="en-US" dirty="0" smtClean="0"/>
+              <a:t> get to store all of your files!</a:t>
+            </a:r>
+          </a:p>
+          <a:p>
+            <a:pPr lvl="2" fontAlgn="base"/>
+            <a:r>
+              <a:rPr lang="en-US" dirty="0" smtClean="0"/>
+              <a:t>Your stuff starts at /</a:t>
+            </a:r>
+            <a:r>
+              <a:rPr lang="en-US" dirty="0" err="1" smtClean="0"/>
+              <a:t>cise</a:t>
+            </a:r>
+            <a:r>
+              <a:rPr lang="en-US" dirty="0" smtClean="0"/>
+              <a:t>/homes/&lt;your-</a:t>
+            </a:r>
+            <a:r>
+              <a:rPr lang="en-US" dirty="0" err="1" smtClean="0"/>
+              <a:t>cise</a:t>
+            </a:r>
+            <a:r>
+              <a:rPr lang="en-US" dirty="0" smtClean="0"/>
+              <a:t>-username&gt;</a:t>
+            </a:r>
+          </a:p>
+          <a:p>
+            <a:pPr fontAlgn="base"/>
+            <a:r>
+              <a:rPr lang="en-US" dirty="0" smtClean="0"/>
+              <a:t>To See What’s in your current directory, use “ls” (short for list)</a:t>
+            </a:r>
+            <a:endParaRPr lang="en-US" dirty="0"/>
+          </a:p>
+          <a:p>
+            <a:r>
+              <a:rPr lang="en-US" dirty="0"/>
+              <a:t>To </a:t>
+            </a:r>
+            <a:r>
+              <a:rPr lang="en-US" dirty="0" smtClean="0"/>
+              <a:t>move into a directory, use “cd” (short for change directory)</a:t>
             </a:r>
           </a:p>
           <a:p>
             <a:pPr lvl="1"/>
-            <a:endParaRPr lang="en-US" sz="2400" dirty="0"/>
+            <a:r>
+              <a:rPr lang="en-US" dirty="0" smtClean="0"/>
+              <a:t>E.g. ”cd Desktop”, to move to your desktop</a:t>
+            </a:r>
           </a:p>
           <a:p>
             <a:pPr lvl="1"/>
             <a:r>
-              <a:rPr lang="en-US" sz="2400" dirty="0" err="1"/>
-              <a:t>WinSCP</a:t>
-            </a:r>
-            <a:endParaRPr lang="en-US" sz="2400" dirty="0"/>
+              <a:rPr lang="en-US" dirty="0" smtClean="0"/>
+              <a:t>To move “back” or “out” of a directory, type “cd ..”</a:t>
+            </a:r>
+          </a:p>
+          <a:p>
+            <a:r>
+              <a:rPr lang="en-US" dirty="0" smtClean="0"/>
+              <a:t>To make new directories, use “</a:t>
+            </a:r>
+            <a:r>
+              <a:rPr lang="en-US" dirty="0" err="1" smtClean="0"/>
+              <a:t>mkdir</a:t>
+            </a:r>
+            <a:r>
+              <a:rPr lang="en-US" dirty="0" smtClean="0"/>
+              <a:t>” </a:t>
+            </a:r>
           </a:p>
           <a:p>
             <a:pPr lvl="1"/>
             <a:r>
-              <a:rPr lang="en-US" sz="2400" dirty="0" err="1"/>
-              <a:t>FileZilla</a:t>
-            </a:r>
-            <a:endParaRPr lang="en-US" sz="2400" dirty="0"/>
+              <a:rPr lang="en-US" dirty="0" smtClean="0"/>
+              <a:t>E.g. “</a:t>
+            </a:r>
+            <a:r>
+              <a:rPr lang="en-US" dirty="0" err="1" smtClean="0"/>
+              <a:t>mkdir</a:t>
+            </a:r>
+            <a:r>
+              <a:rPr lang="en-US" dirty="0" smtClean="0"/>
+              <a:t> COP3503”</a:t>
+            </a:r>
+          </a:p>
+          <a:p>
+            <a:r>
+              <a:rPr lang="en-US" dirty="0" smtClean="0"/>
+              <a:t>To compile programs, the syntax is “g++ your-</a:t>
+            </a:r>
+            <a:r>
+              <a:rPr lang="en-US" dirty="0" err="1" smtClean="0"/>
+              <a:t>program.cpp</a:t>
+            </a:r>
+            <a:endParaRPr lang="en-US" dirty="0"/>
           </a:p>
           <a:p>
             <a:pPr lvl="1"/>
             <a:r>
-              <a:rPr lang="en-US" sz="2400" dirty="0"/>
-              <a:t>SFTP</a:t>
-            </a:r>
-          </a:p>
-          <a:p>
-            <a:endParaRPr lang="en-US" sz="2400" dirty="0" smtClean="0"/>
-          </a:p>
-          <a:p>
-            <a:r>
-              <a:rPr lang="en-US" sz="2400" dirty="0" smtClean="0"/>
-              <a:t>For more information</a:t>
-            </a:r>
-            <a:r>
-              <a:rPr lang="en-US" sz="2400" dirty="0"/>
-              <a:t>, visit </a:t>
-            </a:r>
-            <a:r>
-              <a:rPr lang="en-US" sz="2400" dirty="0" smtClean="0">
-                <a:hlinkClick r:id="rId2"/>
-              </a:rPr>
-              <a:t>http</a:t>
-            </a:r>
-            <a:r>
-              <a:rPr lang="en-US" sz="2400" dirty="0">
-                <a:hlinkClick r:id="rId2"/>
-              </a:rPr>
-              <a:t>://cise.ufl.edu/help/access/remote/</a:t>
-            </a:r>
-            <a:endParaRPr lang="en-US" sz="2400" dirty="0" smtClean="0"/>
+              <a:rPr lang="en-US" dirty="0" smtClean="0"/>
+              <a:t>Will create a file called “</a:t>
+            </a:r>
+            <a:r>
+              <a:rPr lang="en-US" dirty="0" err="1" smtClean="0"/>
+              <a:t>a.out</a:t>
+            </a:r>
+            <a:r>
+              <a:rPr lang="en-US" dirty="0" smtClean="0"/>
+              <a:t>”</a:t>
+            </a:r>
           </a:p>
           <a:p>
             <a:pPr lvl="1"/>
-            <a:endParaRPr lang="en-US" sz="2400" dirty="0" smtClean="0"/>
+            <a:r>
+              <a:rPr lang="en-US" dirty="0" smtClean="0"/>
+              <a:t>You can specify this output name with the –o flag </a:t>
+            </a:r>
+          </a:p>
+          <a:p>
+            <a:r>
+              <a:rPr lang="en-US" dirty="0" smtClean="0"/>
+              <a:t>To run two (or more) commands one after another, use “&amp;&amp;”</a:t>
+            </a:r>
           </a:p>
           <a:p>
             <a:pPr lvl="1"/>
-            <a:endParaRPr lang="en-US" sz="2400" dirty="0"/>
-          </a:p>
-          <a:p>
-            <a:pPr lvl="1"/>
-            <a:endParaRPr lang="en-US" sz="2400" dirty="0"/>
+            <a:r>
+              <a:rPr lang="en-US" dirty="0" smtClean="0"/>
+              <a:t>Use to compile and run in one go. “g++ my-</a:t>
+            </a:r>
+            <a:r>
+              <a:rPr lang="en-US" dirty="0" err="1" smtClean="0"/>
+              <a:t>program.cpp</a:t>
+            </a:r>
+            <a:r>
+              <a:rPr lang="en-US" dirty="0" smtClean="0"/>
+              <a:t> &amp;&amp; ./</a:t>
+            </a:r>
+            <a:r>
+              <a:rPr lang="en-US" dirty="0" err="1" smtClean="0"/>
+              <a:t>a.out</a:t>
+            </a:r>
+            <a:r>
+              <a:rPr lang="en-US" dirty="0" smtClean="0"/>
+              <a:t>”</a:t>
+            </a:r>
+            <a:endParaRPr lang="en-US" dirty="0"/>
           </a:p>
         </p:txBody>
       </p:sp>
@@ -5550,20 +5821,23 @@
           <a:p>
             <a:r>
               <a:rPr lang="en-US" dirty="0" smtClean="0"/>
-              <a:t>Access </a:t>
-            </a:r>
-            <a:r>
+              <a:t>Terminal Basics</a:t>
+            </a:r>
+            <a:br>
               <a:rPr lang="en-US" dirty="0" smtClean="0"/>
-              <a:t>remotely (cont.)</a:t>
-            </a:r>
-            <a:endParaRPr lang="en-US" dirty="0"/>
+            </a:br>
+            <a:r>
+              <a:rPr lang="en-US" sz="1800" dirty="0" smtClean="0"/>
+              <a:t>Why wasn’t this here before?</a:t>
+            </a:r>
+            <a:endParaRPr lang="en-US" sz="1800" dirty="0"/>
           </a:p>
         </p:txBody>
       </p:sp>
     </p:spTree>
     <p:extLst>
       <p:ext uri="{BB962C8B-B14F-4D97-AF65-F5344CB8AC3E}">
-        <p14:creationId xmlns:p14="http://schemas.microsoft.com/office/powerpoint/2010/main" val="997442421"/>
+        <p14:creationId xmlns:p14="http://schemas.microsoft.com/office/powerpoint/2010/main" val="1910562644"/>
       </p:ext>
     </p:extLst>
   </p:cSld>

</xml_diff>